<commit_message>
Added sections on EVL+STrace
</commit_message>
<xml_diff>
--- a/diagrams/Metamodels.pptx
+++ b/diagrams/Metamodels.pptx
@@ -243,7 +243,7 @@
           <a:p>
             <a:fld id="{B6391CA5-9E0E-4446-A9D7-615ACC2704AF}" type="datetimeFigureOut">
               <a:rPr lang="de-DE" smtClean="0"/>
-              <a:t>25.09.2017</a:t>
+              <a:t>14.08.2018</a:t>
             </a:fld>
             <a:endParaRPr lang="de-DE"/>
           </a:p>
@@ -413,7 +413,7 @@
           <a:p>
             <a:fld id="{B6391CA5-9E0E-4446-A9D7-615ACC2704AF}" type="datetimeFigureOut">
               <a:rPr lang="de-DE" smtClean="0"/>
-              <a:t>25.09.2017</a:t>
+              <a:t>14.08.2018</a:t>
             </a:fld>
             <a:endParaRPr lang="de-DE"/>
           </a:p>
@@ -593,7 +593,7 @@
           <a:p>
             <a:fld id="{B6391CA5-9E0E-4446-A9D7-615ACC2704AF}" type="datetimeFigureOut">
               <a:rPr lang="de-DE" smtClean="0"/>
-              <a:t>25.09.2017</a:t>
+              <a:t>14.08.2018</a:t>
             </a:fld>
             <a:endParaRPr lang="de-DE"/>
           </a:p>
@@ -763,7 +763,7 @@
           <a:p>
             <a:fld id="{B6391CA5-9E0E-4446-A9D7-615ACC2704AF}" type="datetimeFigureOut">
               <a:rPr lang="de-DE" smtClean="0"/>
-              <a:t>25.09.2017</a:t>
+              <a:t>14.08.2018</a:t>
             </a:fld>
             <a:endParaRPr lang="de-DE"/>
           </a:p>
@@ -1009,7 +1009,7 @@
           <a:p>
             <a:fld id="{B6391CA5-9E0E-4446-A9D7-615ACC2704AF}" type="datetimeFigureOut">
               <a:rPr lang="de-DE" smtClean="0"/>
-              <a:t>25.09.2017</a:t>
+              <a:t>14.08.2018</a:t>
             </a:fld>
             <a:endParaRPr lang="de-DE"/>
           </a:p>
@@ -1241,7 +1241,7 @@
           <a:p>
             <a:fld id="{B6391CA5-9E0E-4446-A9D7-615ACC2704AF}" type="datetimeFigureOut">
               <a:rPr lang="de-DE" smtClean="0"/>
-              <a:t>25.09.2017</a:t>
+              <a:t>14.08.2018</a:t>
             </a:fld>
             <a:endParaRPr lang="de-DE"/>
           </a:p>
@@ -1608,7 +1608,7 @@
           <a:p>
             <a:fld id="{B6391CA5-9E0E-4446-A9D7-615ACC2704AF}" type="datetimeFigureOut">
               <a:rPr lang="de-DE" smtClean="0"/>
-              <a:t>25.09.2017</a:t>
+              <a:t>14.08.2018</a:t>
             </a:fld>
             <a:endParaRPr lang="de-DE"/>
           </a:p>
@@ -1726,7 +1726,7 @@
           <a:p>
             <a:fld id="{B6391CA5-9E0E-4446-A9D7-615ACC2704AF}" type="datetimeFigureOut">
               <a:rPr lang="de-DE" smtClean="0"/>
-              <a:t>25.09.2017</a:t>
+              <a:t>14.08.2018</a:t>
             </a:fld>
             <a:endParaRPr lang="de-DE"/>
           </a:p>
@@ -1821,7 +1821,7 @@
           <a:p>
             <a:fld id="{B6391CA5-9E0E-4446-A9D7-615ACC2704AF}" type="datetimeFigureOut">
               <a:rPr lang="de-DE" smtClean="0"/>
-              <a:t>25.09.2017</a:t>
+              <a:t>14.08.2018</a:t>
             </a:fld>
             <a:endParaRPr lang="de-DE"/>
           </a:p>
@@ -2098,7 +2098,7 @@
           <a:p>
             <a:fld id="{B6391CA5-9E0E-4446-A9D7-615ACC2704AF}" type="datetimeFigureOut">
               <a:rPr lang="de-DE" smtClean="0"/>
-              <a:t>25.09.2017</a:t>
+              <a:t>14.08.2018</a:t>
             </a:fld>
             <a:endParaRPr lang="de-DE"/>
           </a:p>
@@ -2351,7 +2351,7 @@
           <a:p>
             <a:fld id="{B6391CA5-9E0E-4446-A9D7-615ACC2704AF}" type="datetimeFigureOut">
               <a:rPr lang="de-DE" smtClean="0"/>
-              <a:t>25.09.2017</a:t>
+              <a:t>14.08.2018</a:t>
             </a:fld>
             <a:endParaRPr lang="de-DE"/>
           </a:p>
@@ -2564,7 +2564,7 @@
           <a:p>
             <a:fld id="{B6391CA5-9E0E-4446-A9D7-615ACC2704AF}" type="datetimeFigureOut">
               <a:rPr lang="de-DE" smtClean="0"/>
-              <a:t>25.09.2017</a:t>
+              <a:t>14.08.2018</a:t>
             </a:fld>
             <a:endParaRPr lang="de-DE"/>
           </a:p>
@@ -3097,25 +3097,11 @@
             <a:lstStyle/>
             <a:p>
               <a:r>
-                <a:rPr lang="de-DE" sz="1200" dirty="0" smtClean="0">
-                  <a:latin typeface="Consolas" panose="020B0609020204030204" pitchFamily="49" charset="0"/>
-                  <a:cs typeface="Consolas" panose="020B0609020204030204" pitchFamily="49" charset="0"/>
-                </a:rPr>
-                <a:t>+ </a:t>
-              </a:r>
-              <a:r>
-                <a:rPr lang="de-DE" sz="1200" dirty="0" err="1">
-                  <a:latin typeface="Consolas" panose="020B0609020204030204" pitchFamily="49" charset="0"/>
-                  <a:cs typeface="Consolas" panose="020B0609020204030204" pitchFamily="49" charset="0"/>
-                </a:rPr>
-                <a:t>n</a:t>
-              </a:r>
-              <a:r>
                 <a:rPr lang="de-DE" sz="1200" dirty="0" err="1" smtClean="0">
                   <a:latin typeface="Consolas" panose="020B0609020204030204" pitchFamily="49" charset="0"/>
                   <a:cs typeface="Consolas" panose="020B0609020204030204" pitchFamily="49" charset="0"/>
                 </a:rPr>
-                <a:t>ame</a:t>
+                <a:t>name</a:t>
               </a:r>
               <a:r>
                 <a:rPr lang="de-DE" sz="1200" dirty="0" smtClean="0">
@@ -3223,25 +3209,11 @@
             <a:lstStyle/>
             <a:p>
               <a:r>
-                <a:rPr lang="de-DE" sz="1200" dirty="0" smtClean="0">
-                  <a:latin typeface="Consolas" panose="020B0609020204030204" pitchFamily="49" charset="0"/>
-                  <a:cs typeface="Consolas" panose="020B0609020204030204" pitchFamily="49" charset="0"/>
-                </a:rPr>
-                <a:t>+ </a:t>
-              </a:r>
-              <a:r>
-                <a:rPr lang="de-DE" sz="1200" dirty="0" err="1">
-                  <a:latin typeface="Consolas" panose="020B0609020204030204" pitchFamily="49" charset="0"/>
-                  <a:cs typeface="Consolas" panose="020B0609020204030204" pitchFamily="49" charset="0"/>
-                </a:rPr>
-                <a:t>n</a:t>
-              </a:r>
-              <a:r>
                 <a:rPr lang="de-DE" sz="1200" dirty="0" err="1" smtClean="0">
                   <a:latin typeface="Consolas" panose="020B0609020204030204" pitchFamily="49" charset="0"/>
                   <a:cs typeface="Consolas" panose="020B0609020204030204" pitchFamily="49" charset="0"/>
                 </a:rPr>
-                <a:t>ame</a:t>
+                <a:t>name</a:t>
               </a:r>
               <a:r>
                 <a:rPr lang="de-DE" sz="1200" dirty="0" smtClean="0">
@@ -4428,25 +4400,11 @@
             <a:lstStyle/>
             <a:p>
               <a:r>
-                <a:rPr lang="de-DE" sz="1200" dirty="0" smtClean="0">
-                  <a:latin typeface="Consolas" panose="020B0609020204030204" pitchFamily="49" charset="0"/>
-                  <a:cs typeface="Consolas" panose="020B0609020204030204" pitchFamily="49" charset="0"/>
-                </a:rPr>
-                <a:t>+ </a:t>
-              </a:r>
-              <a:r>
-                <a:rPr lang="de-DE" sz="1200" dirty="0" err="1">
-                  <a:latin typeface="Consolas" panose="020B0609020204030204" pitchFamily="49" charset="0"/>
-                  <a:cs typeface="Consolas" panose="020B0609020204030204" pitchFamily="49" charset="0"/>
-                </a:rPr>
-                <a:t>n</a:t>
-              </a:r>
-              <a:r>
                 <a:rPr lang="de-DE" sz="1200" dirty="0" err="1" smtClean="0">
                   <a:latin typeface="Consolas" panose="020B0609020204030204" pitchFamily="49" charset="0"/>
                   <a:cs typeface="Consolas" panose="020B0609020204030204" pitchFamily="49" charset="0"/>
                 </a:rPr>
-                <a:t>ame</a:t>
+                <a:t>name</a:t>
               </a:r>
               <a:r>
                 <a:rPr lang="de-DE" sz="1200" dirty="0" smtClean="0">
@@ -4465,13 +4423,6 @@
             </a:p>
             <a:p>
               <a:r>
-                <a:rPr lang="de-DE" sz="1200" dirty="0" smtClean="0">
-                  <a:latin typeface="Consolas" panose="020B0609020204030204" pitchFamily="49" charset="0"/>
-                  <a:cs typeface="Consolas" panose="020B0609020204030204" pitchFamily="49" charset="0"/>
-                </a:rPr>
-                <a:t>+ </a:t>
-              </a:r>
-              <a:r>
                 <a:rPr lang="de-DE" sz="1200" dirty="0" err="1" smtClean="0">
                   <a:latin typeface="Consolas" panose="020B0609020204030204" pitchFamily="49" charset="0"/>
                   <a:cs typeface="Consolas" panose="020B0609020204030204" pitchFamily="49" charset="0"/>
@@ -4483,7 +4434,14 @@
                   <a:latin typeface="Consolas" panose="020B0609020204030204" pitchFamily="49" charset="0"/>
                   <a:cs typeface="Consolas" panose="020B0609020204030204" pitchFamily="49" charset="0"/>
                 </a:rPr>
-                <a:t> : Date</a:t>
+                <a:t> </a:t>
+              </a:r>
+              <a:r>
+                <a:rPr lang="de-DE" sz="1200" dirty="0" smtClean="0">
+                  <a:latin typeface="Consolas" panose="020B0609020204030204" pitchFamily="49" charset="0"/>
+                  <a:cs typeface="Consolas" panose="020B0609020204030204" pitchFamily="49" charset="0"/>
+                </a:rPr>
+                <a:t>: Date</a:t>
               </a:r>
             </a:p>
           </p:txBody>

</xml_diff>